<commit_message>
Slightly changed the package structure.
</commit_message>
<xml_diff>
--- a/papers/.ppt/TimeSeriesCV_15032024.pptx
+++ b/papers/.ppt/TimeSeriesCV_15032024.pptx
@@ -286,7 +286,7 @@
           <a:p>
             <a:fld id="{0FEE928B-C7F0-48C6-BE5C-4C114E091DF6}" type="datetimeFigureOut">
               <a:rPr lang="en-US" smtClean="0"/>
-              <a:t>28-Mar-24</a:t>
+              <a:t>02-Apr-24</a:t>
             </a:fld>
             <a:endParaRPr lang="en-US"/>
           </a:p>
@@ -484,7 +484,7 @@
           <a:p>
             <a:fld id="{0FEE928B-C7F0-48C6-BE5C-4C114E091DF6}" type="datetimeFigureOut">
               <a:rPr lang="en-US" smtClean="0"/>
-              <a:t>28-Mar-24</a:t>
+              <a:t>02-Apr-24</a:t>
             </a:fld>
             <a:endParaRPr lang="en-US"/>
           </a:p>
@@ -692,7 +692,7 @@
           <a:p>
             <a:fld id="{0FEE928B-C7F0-48C6-BE5C-4C114E091DF6}" type="datetimeFigureOut">
               <a:rPr lang="en-US" smtClean="0"/>
-              <a:t>28-Mar-24</a:t>
+              <a:t>02-Apr-24</a:t>
             </a:fld>
             <a:endParaRPr lang="en-US"/>
           </a:p>
@@ -890,7 +890,7 @@
           <a:p>
             <a:fld id="{0FEE928B-C7F0-48C6-BE5C-4C114E091DF6}" type="datetimeFigureOut">
               <a:rPr lang="en-US" smtClean="0"/>
-              <a:t>28-Mar-24</a:t>
+              <a:t>02-Apr-24</a:t>
             </a:fld>
             <a:endParaRPr lang="en-US"/>
           </a:p>
@@ -1165,7 +1165,7 @@
           <a:p>
             <a:fld id="{0FEE928B-C7F0-48C6-BE5C-4C114E091DF6}" type="datetimeFigureOut">
               <a:rPr lang="en-US" smtClean="0"/>
-              <a:t>28-Mar-24</a:t>
+              <a:t>02-Apr-24</a:t>
             </a:fld>
             <a:endParaRPr lang="en-US"/>
           </a:p>
@@ -1430,7 +1430,7 @@
           <a:p>
             <a:fld id="{0FEE928B-C7F0-48C6-BE5C-4C114E091DF6}" type="datetimeFigureOut">
               <a:rPr lang="en-US" smtClean="0"/>
-              <a:t>28-Mar-24</a:t>
+              <a:t>02-Apr-24</a:t>
             </a:fld>
             <a:endParaRPr lang="en-US"/>
           </a:p>
@@ -1842,7 +1842,7 @@
           <a:p>
             <a:fld id="{0FEE928B-C7F0-48C6-BE5C-4C114E091DF6}" type="datetimeFigureOut">
               <a:rPr lang="en-US" smtClean="0"/>
-              <a:t>28-Mar-24</a:t>
+              <a:t>02-Apr-24</a:t>
             </a:fld>
             <a:endParaRPr lang="en-US"/>
           </a:p>
@@ -1983,7 +1983,7 @@
           <a:p>
             <a:fld id="{0FEE928B-C7F0-48C6-BE5C-4C114E091DF6}" type="datetimeFigureOut">
               <a:rPr lang="en-US" smtClean="0"/>
-              <a:t>28-Mar-24</a:t>
+              <a:t>02-Apr-24</a:t>
             </a:fld>
             <a:endParaRPr lang="en-US"/>
           </a:p>
@@ -2096,7 +2096,7 @@
           <a:p>
             <a:fld id="{0FEE928B-C7F0-48C6-BE5C-4C114E091DF6}" type="datetimeFigureOut">
               <a:rPr lang="en-US" smtClean="0"/>
-              <a:t>28-Mar-24</a:t>
+              <a:t>02-Apr-24</a:t>
             </a:fld>
             <a:endParaRPr lang="en-US"/>
           </a:p>
@@ -2407,7 +2407,7 @@
           <a:p>
             <a:fld id="{0FEE928B-C7F0-48C6-BE5C-4C114E091DF6}" type="datetimeFigureOut">
               <a:rPr lang="en-US" smtClean="0"/>
-              <a:t>28-Mar-24</a:t>
+              <a:t>02-Apr-24</a:t>
             </a:fld>
             <a:endParaRPr lang="en-US"/>
           </a:p>
@@ -2695,7 +2695,7 @@
           <a:p>
             <a:fld id="{0FEE928B-C7F0-48C6-BE5C-4C114E091DF6}" type="datetimeFigureOut">
               <a:rPr lang="en-US" smtClean="0"/>
-              <a:t>28-Mar-24</a:t>
+              <a:t>02-Apr-24</a:t>
             </a:fld>
             <a:endParaRPr lang="en-US"/>
           </a:p>
@@ -2936,7 +2936,7 @@
           <a:p>
             <a:fld id="{0FEE928B-C7F0-48C6-BE5C-4C114E091DF6}" type="datetimeFigureOut">
               <a:rPr lang="en-US" smtClean="0"/>
-              <a:t>28-Mar-24</a:t>
+              <a:t>02-Apr-24</a:t>
             </a:fld>
             <a:endParaRPr lang="en-US"/>
           </a:p>
@@ -4804,12 +4804,12 @@
               <a:buChar char="•"/>
             </a:pPr>
             <a:r>
-              <a:rPr lang="en-US" dirty="0" err="1"/>
-              <a:t>Nequist</a:t>
+              <a:rPr lang="en-US"/>
+              <a:t>Nyquist </a:t>
             </a:r>
             <a:r>
               <a:rPr lang="en-US" dirty="0"/>
-              <a:t> Theorem</a:t>
+              <a:t>Theorem</a:t>
             </a:r>
           </a:p>
           <a:p>

</xml_diff>